<commit_message>
WIP: update git presentation
</commit_message>
<xml_diff>
--- a/skills/git/Git - Intro for all.pptx
+++ b/skills/git/Git - Intro for all.pptx
@@ -8842,8 +8842,8 @@
         </p:blipFill>
         <p:spPr bwMode="auto">
           <a:xfrm>
-            <a:off x="864524" y="814477"/>
-            <a:ext cx="7464829" cy="2841234"/>
+            <a:off x="307537" y="1188098"/>
+            <a:ext cx="8528925" cy="3246246"/>
           </a:xfrm>
           <a:prstGeom prst="rect">
             <a:avLst/>
@@ -8860,477 +8860,6 @@
           </a:extLst>
         </p:spPr>
       </p:pic>
-      <p:sp>
-        <p:nvSpPr>
-          <p:cNvPr id="11" name="Google Shape;66;p14">
-            <a:extLst>
-              <a:ext uri="{FF2B5EF4-FFF2-40B4-BE49-F238E27FC236}">
-                <a16:creationId xmlns:a16="http://schemas.microsoft.com/office/drawing/2014/main" id="{8745B95F-B176-9935-A6BF-F901C51B1CC1}"/>
-              </a:ext>
-            </a:extLst>
-          </p:cNvPr>
-          <p:cNvSpPr txBox="1"/>
-          <p:nvPr/>
-        </p:nvSpPr>
-        <p:spPr>
-          <a:xfrm>
-            <a:off x="1280159" y="3599710"/>
-            <a:ext cx="2374229" cy="1231106"/>
-          </a:xfrm>
-          <a:prstGeom prst="rect">
-            <a:avLst/>
-          </a:prstGeom>
-          <a:noFill/>
-          <a:ln>
-            <a:noFill/>
-          </a:ln>
-        </p:spPr>
-        <p:txBody>
-          <a:bodyPr spcFirstLastPara="1" wrap="square" lIns="0" tIns="0" rIns="0" bIns="0" anchor="t" anchorCtr="0">
-            <a:spAutoFit/>
-          </a:bodyPr>
-          <a:lstStyle/>
-          <a:p>
-            <a:pPr marL="0" lvl="0" indent="0" algn="l" rtl="0">
-              <a:spcBef>
-                <a:spcPts val="0"/>
-              </a:spcBef>
-              <a:spcAft>
-                <a:spcPts val="0"/>
-              </a:spcAft>
-              <a:buNone/>
-            </a:pPr>
-            <a:r>
-              <a:rPr lang="en" sz="1600" dirty="0">
-                <a:solidFill>
-                  <a:srgbClr val="EB3D26"/>
-                </a:solidFill>
-                <a:latin typeface="IBM Plex Sans Light"/>
-                <a:ea typeface="IBM Plex Sans Light"/>
-                <a:cs typeface="IBM Plex Sans Light"/>
-                <a:sym typeface="IBM Plex Sans Light"/>
-              </a:rPr>
-              <a:t>•</a:t>
-            </a:r>
-            <a:r>
-              <a:rPr lang="en" sz="1600" dirty="0">
-                <a:solidFill>
-                  <a:srgbClr val="000000"/>
-                </a:solidFill>
-                <a:latin typeface="IBM Plex Sans Light"/>
-                <a:ea typeface="IBM Plex Sans Light"/>
-                <a:cs typeface="IBM Plex Sans Light"/>
-                <a:sym typeface="IBM Plex Sans Light"/>
-              </a:rPr>
-              <a:t>  </a:t>
-            </a:r>
-            <a:r>
-              <a:rPr lang="en-US" sz="1600" dirty="0">
-                <a:solidFill>
-                  <a:srgbClr val="000000"/>
-                </a:solidFill>
-                <a:latin typeface="IBM Plex Sans Light"/>
-                <a:ea typeface="IBM Plex Sans Light"/>
-                <a:cs typeface="IBM Plex Sans Light"/>
-                <a:sym typeface="IBM Plex Sans Light"/>
-              </a:rPr>
-              <a:t>git </a:t>
-            </a:r>
-            <a:r>
-              <a:rPr lang="en-US" sz="1600" dirty="0" err="1">
-                <a:solidFill>
-                  <a:srgbClr val="000000"/>
-                </a:solidFill>
-                <a:latin typeface="IBM Plex Sans Light"/>
-                <a:ea typeface="IBM Plex Sans Light"/>
-                <a:cs typeface="IBM Plex Sans Light"/>
-                <a:sym typeface="IBM Plex Sans Light"/>
-              </a:rPr>
-              <a:t>init</a:t>
-            </a:r>
-            <a:endParaRPr lang="en-US" sz="1600" dirty="0">
-              <a:latin typeface="IBM Plex Sans Light"/>
-              <a:ea typeface="IBM Plex Sans Light"/>
-              <a:cs typeface="IBM Plex Sans Light"/>
-              <a:sym typeface="IBM Plex Sans Light"/>
-            </a:endParaRPr>
-          </a:p>
-          <a:p>
-            <a:pPr marL="0" lvl="0" indent="0" algn="l" rtl="0">
-              <a:spcBef>
-                <a:spcPts val="0"/>
-              </a:spcBef>
-              <a:spcAft>
-                <a:spcPts val="0"/>
-              </a:spcAft>
-              <a:buNone/>
-            </a:pPr>
-            <a:endParaRPr lang="en-US" sz="1600" dirty="0">
-              <a:latin typeface="IBM Plex Sans Light"/>
-              <a:ea typeface="IBM Plex Sans Light"/>
-              <a:cs typeface="IBM Plex Sans Light"/>
-              <a:sym typeface="IBM Plex Sans Light"/>
-            </a:endParaRPr>
-          </a:p>
-          <a:p>
-            <a:pPr marL="0" lvl="0" indent="0" algn="l" rtl="0">
-              <a:spcBef>
-                <a:spcPts val="0"/>
-              </a:spcBef>
-              <a:spcAft>
-                <a:spcPts val="0"/>
-              </a:spcAft>
-              <a:buNone/>
-            </a:pPr>
-            <a:r>
-              <a:rPr lang="en" sz="1600" dirty="0">
-                <a:solidFill>
-                  <a:srgbClr val="EB3D26"/>
-                </a:solidFill>
-                <a:latin typeface="IBM Plex Sans Light"/>
-                <a:ea typeface="IBM Plex Sans Light"/>
-                <a:cs typeface="IBM Plex Sans Light"/>
-                <a:sym typeface="IBM Plex Sans Light"/>
-              </a:rPr>
-              <a:t>• </a:t>
-            </a:r>
-            <a:r>
-              <a:rPr lang="en" sz="1600" dirty="0">
-                <a:solidFill>
-                  <a:srgbClr val="000000"/>
-                </a:solidFill>
-                <a:latin typeface="IBM Plex Sans Light"/>
-                <a:ea typeface="IBM Plex Sans Light"/>
-                <a:cs typeface="IBM Plex Sans Light"/>
-                <a:sym typeface="IBM Plex Sans Light"/>
-              </a:rPr>
-              <a:t> </a:t>
-            </a:r>
-            <a:r>
-              <a:rPr lang="en-US" sz="1600" dirty="0">
-                <a:solidFill>
-                  <a:srgbClr val="000000"/>
-                </a:solidFill>
-                <a:latin typeface="IBM Plex Sans Light"/>
-                <a:ea typeface="IBM Plex Sans Light"/>
-                <a:cs typeface="IBM Plex Sans Light"/>
-                <a:sym typeface="IBM Plex Sans Light"/>
-              </a:rPr>
-              <a:t>git add</a:t>
-            </a:r>
-            <a:endParaRPr lang="en-US" sz="1600" dirty="0">
-              <a:latin typeface="IBM Plex Sans Light"/>
-              <a:ea typeface="IBM Plex Sans Light"/>
-              <a:cs typeface="IBM Plex Sans Light"/>
-              <a:sym typeface="IBM Plex Sans Light"/>
-            </a:endParaRPr>
-          </a:p>
-          <a:p>
-            <a:pPr marL="0" lvl="0" indent="0" algn="l" rtl="0">
-              <a:spcBef>
-                <a:spcPts val="0"/>
-              </a:spcBef>
-              <a:spcAft>
-                <a:spcPts val="0"/>
-              </a:spcAft>
-              <a:buNone/>
-            </a:pPr>
-            <a:endParaRPr lang="en-US" sz="1600" dirty="0">
-              <a:latin typeface="IBM Plex Sans Light"/>
-              <a:ea typeface="IBM Plex Sans Light"/>
-              <a:cs typeface="IBM Plex Sans Light"/>
-              <a:sym typeface="IBM Plex Sans Light"/>
-            </a:endParaRPr>
-          </a:p>
-          <a:p>
-            <a:pPr marL="0" lvl="0" indent="0" algn="l" rtl="0">
-              <a:spcBef>
-                <a:spcPts val="0"/>
-              </a:spcBef>
-              <a:spcAft>
-                <a:spcPts val="0"/>
-              </a:spcAft>
-              <a:buNone/>
-            </a:pPr>
-            <a:r>
-              <a:rPr lang="en" sz="1600" dirty="0">
-                <a:solidFill>
-                  <a:srgbClr val="EB3D26"/>
-                </a:solidFill>
-                <a:latin typeface="IBM Plex Sans Light"/>
-                <a:ea typeface="IBM Plex Sans Light"/>
-                <a:cs typeface="IBM Plex Sans Light"/>
-                <a:sym typeface="IBM Plex Sans Light"/>
-              </a:rPr>
-              <a:t>• </a:t>
-            </a:r>
-            <a:r>
-              <a:rPr lang="en" sz="1600" dirty="0">
-                <a:solidFill>
-                  <a:srgbClr val="000000"/>
-                </a:solidFill>
-                <a:latin typeface="IBM Plex Sans Light"/>
-                <a:ea typeface="IBM Plex Sans Light"/>
-                <a:cs typeface="IBM Plex Sans Light"/>
-                <a:sym typeface="IBM Plex Sans Light"/>
-              </a:rPr>
-              <a:t> </a:t>
-            </a:r>
-            <a:r>
-              <a:rPr lang="en-US" sz="1600" dirty="0">
-                <a:solidFill>
-                  <a:srgbClr val="000000"/>
-                </a:solidFill>
-                <a:latin typeface="IBM Plex Sans Light"/>
-                <a:ea typeface="IBM Plex Sans Light"/>
-                <a:cs typeface="IBM Plex Sans Light"/>
-                <a:sym typeface="IBM Plex Sans Light"/>
-              </a:rPr>
-              <a:t>git commit</a:t>
-            </a:r>
-            <a:endParaRPr lang="en-US" sz="1600" dirty="0">
-              <a:latin typeface="IBM Plex Sans Light"/>
-              <a:ea typeface="IBM Plex Sans Light"/>
-              <a:cs typeface="IBM Plex Sans Light"/>
-              <a:sym typeface="IBM Plex Sans Light"/>
-            </a:endParaRPr>
-          </a:p>
-        </p:txBody>
-      </p:sp>
-      <p:sp>
-        <p:nvSpPr>
-          <p:cNvPr id="12" name="Google Shape;66;p14">
-            <a:extLst>
-              <a:ext uri="{FF2B5EF4-FFF2-40B4-BE49-F238E27FC236}">
-                <a16:creationId xmlns:a16="http://schemas.microsoft.com/office/drawing/2014/main" id="{2EDCA98B-1107-AFB0-DFF4-45ABFE1F824F}"/>
-              </a:ext>
-            </a:extLst>
-          </p:cNvPr>
-          <p:cNvSpPr txBox="1"/>
-          <p:nvPr/>
-        </p:nvSpPr>
-        <p:spPr>
-          <a:xfrm>
-            <a:off x="5037070" y="3599710"/>
-            <a:ext cx="2953349" cy="1231106"/>
-          </a:xfrm>
-          <a:prstGeom prst="rect">
-            <a:avLst/>
-          </a:prstGeom>
-          <a:noFill/>
-          <a:ln>
-            <a:noFill/>
-          </a:ln>
-        </p:spPr>
-        <p:txBody>
-          <a:bodyPr spcFirstLastPara="1" wrap="square" lIns="0" tIns="0" rIns="0" bIns="0" anchor="t" anchorCtr="0">
-            <a:spAutoFit/>
-          </a:bodyPr>
-          <a:lstStyle/>
-          <a:p>
-            <a:pPr marL="0" lvl="0" indent="0" algn="l" rtl="0">
-              <a:spcBef>
-                <a:spcPts val="0"/>
-              </a:spcBef>
-              <a:spcAft>
-                <a:spcPts val="0"/>
-              </a:spcAft>
-              <a:buNone/>
-            </a:pPr>
-            <a:r>
-              <a:rPr lang="en" sz="1600" dirty="0">
-                <a:solidFill>
-                  <a:srgbClr val="EB3D26"/>
-                </a:solidFill>
-                <a:latin typeface="IBM Plex Sans Light"/>
-                <a:ea typeface="IBM Plex Sans Light"/>
-                <a:cs typeface="IBM Plex Sans Light"/>
-                <a:sym typeface="IBM Plex Sans Light"/>
-              </a:rPr>
-              <a:t>• </a:t>
-            </a:r>
-            <a:r>
-              <a:rPr lang="en" sz="1600" dirty="0">
-                <a:solidFill>
-                  <a:srgbClr val="000000"/>
-                </a:solidFill>
-                <a:latin typeface="IBM Plex Sans Light"/>
-                <a:ea typeface="IBM Plex Sans Light"/>
-                <a:cs typeface="IBM Plex Sans Light"/>
-                <a:sym typeface="IBM Plex Sans Light"/>
-              </a:rPr>
-              <a:t> </a:t>
-            </a:r>
-            <a:r>
-              <a:rPr lang="en-US" sz="1600" dirty="0">
-                <a:solidFill>
-                  <a:srgbClr val="000000"/>
-                </a:solidFill>
-                <a:latin typeface="IBM Plex Sans Light"/>
-                <a:ea typeface="IBM Plex Sans Light"/>
-                <a:cs typeface="IBM Plex Sans Light"/>
-                <a:sym typeface="IBM Plex Sans Light"/>
-              </a:rPr>
-              <a:t>git status</a:t>
-            </a:r>
-            <a:endParaRPr lang="en-US" sz="1600" dirty="0">
-              <a:latin typeface="IBM Plex Sans Light"/>
-              <a:ea typeface="IBM Plex Sans Light"/>
-              <a:cs typeface="IBM Plex Sans Light"/>
-              <a:sym typeface="IBM Plex Sans Light"/>
-            </a:endParaRPr>
-          </a:p>
-          <a:p>
-            <a:pPr marL="0" lvl="0" indent="0" algn="l" rtl="0">
-              <a:spcBef>
-                <a:spcPts val="0"/>
-              </a:spcBef>
-              <a:spcAft>
-                <a:spcPts val="0"/>
-              </a:spcAft>
-              <a:buNone/>
-            </a:pPr>
-            <a:endParaRPr lang="en" sz="1600" dirty="0">
-              <a:solidFill>
-                <a:srgbClr val="EB3D26"/>
-              </a:solidFill>
-              <a:latin typeface="IBM Plex Sans Light"/>
-              <a:ea typeface="IBM Plex Sans Light"/>
-              <a:cs typeface="IBM Plex Sans Light"/>
-              <a:sym typeface="IBM Plex Sans Light"/>
-            </a:endParaRPr>
-          </a:p>
-          <a:p>
-            <a:pPr marL="0" lvl="0" indent="0" algn="l" rtl="0">
-              <a:spcBef>
-                <a:spcPts val="0"/>
-              </a:spcBef>
-              <a:spcAft>
-                <a:spcPts val="0"/>
-              </a:spcAft>
-              <a:buNone/>
-            </a:pPr>
-            <a:r>
-              <a:rPr lang="en" sz="1600" dirty="0">
-                <a:solidFill>
-                  <a:srgbClr val="EB3D26"/>
-                </a:solidFill>
-                <a:latin typeface="IBM Plex Sans Light"/>
-                <a:ea typeface="IBM Plex Sans Light"/>
-                <a:cs typeface="IBM Plex Sans Light"/>
-                <a:sym typeface="IBM Plex Sans Light"/>
-              </a:rPr>
-              <a:t>• </a:t>
-            </a:r>
-            <a:r>
-              <a:rPr lang="en" sz="1600" dirty="0">
-                <a:solidFill>
-                  <a:srgbClr val="000000"/>
-                </a:solidFill>
-                <a:latin typeface="IBM Plex Sans Light"/>
-                <a:ea typeface="IBM Plex Sans Light"/>
-                <a:cs typeface="IBM Plex Sans Light"/>
-                <a:sym typeface="IBM Plex Sans Light"/>
-              </a:rPr>
-              <a:t> </a:t>
-            </a:r>
-            <a:r>
-              <a:rPr lang="en-US" sz="1600" dirty="0">
-                <a:solidFill>
-                  <a:srgbClr val="000000"/>
-                </a:solidFill>
-                <a:latin typeface="IBM Plex Sans Light"/>
-                <a:ea typeface="IBM Plex Sans Light"/>
-                <a:cs typeface="IBM Plex Sans Light"/>
-                <a:sym typeface="IBM Plex Sans Light"/>
-              </a:rPr>
-              <a:t>git log</a:t>
-            </a:r>
-            <a:endParaRPr lang="en-US" sz="1600" dirty="0">
-              <a:latin typeface="IBM Plex Sans Light"/>
-              <a:ea typeface="IBM Plex Sans Light"/>
-              <a:cs typeface="IBM Plex Sans Light"/>
-              <a:sym typeface="IBM Plex Sans Light"/>
-            </a:endParaRPr>
-          </a:p>
-          <a:p>
-            <a:pPr marL="0" lvl="0" indent="0" algn="l" rtl="0">
-              <a:spcBef>
-                <a:spcPts val="0"/>
-              </a:spcBef>
-              <a:spcAft>
-                <a:spcPts val="0"/>
-              </a:spcAft>
-              <a:buNone/>
-            </a:pPr>
-            <a:endParaRPr lang="en" sz="1600" dirty="0">
-              <a:solidFill>
-                <a:srgbClr val="EB3D26"/>
-              </a:solidFill>
-              <a:latin typeface="IBM Plex Sans Light"/>
-              <a:ea typeface="IBM Plex Sans Light"/>
-              <a:cs typeface="IBM Plex Sans Light"/>
-              <a:sym typeface="IBM Plex Sans Light"/>
-            </a:endParaRPr>
-          </a:p>
-          <a:p>
-            <a:pPr marL="0" lvl="0" indent="0" algn="l" rtl="0">
-              <a:spcBef>
-                <a:spcPts val="0"/>
-              </a:spcBef>
-              <a:spcAft>
-                <a:spcPts val="0"/>
-              </a:spcAft>
-              <a:buNone/>
-            </a:pPr>
-            <a:r>
-              <a:rPr lang="en" sz="1600" dirty="0">
-                <a:solidFill>
-                  <a:srgbClr val="EB3D26"/>
-                </a:solidFill>
-                <a:latin typeface="IBM Plex Sans Light"/>
-                <a:ea typeface="IBM Plex Sans Light"/>
-                <a:cs typeface="IBM Plex Sans Light"/>
-                <a:sym typeface="IBM Plex Sans Light"/>
-              </a:rPr>
-              <a:t>• </a:t>
-            </a:r>
-            <a:r>
-              <a:rPr lang="en" sz="1600" dirty="0">
-                <a:solidFill>
-                  <a:srgbClr val="000000"/>
-                </a:solidFill>
-                <a:latin typeface="IBM Plex Sans Light"/>
-                <a:ea typeface="IBM Plex Sans Light"/>
-                <a:cs typeface="IBM Plex Sans Light"/>
-                <a:sym typeface="IBM Plex Sans Light"/>
-              </a:rPr>
-              <a:t> </a:t>
-            </a:r>
-            <a:r>
-              <a:rPr lang="en-US" sz="1600" dirty="0">
-                <a:solidFill>
-                  <a:srgbClr val="000000"/>
-                </a:solidFill>
-                <a:latin typeface="IBM Plex Sans Light"/>
-                <a:ea typeface="IBM Plex Sans Light"/>
-                <a:cs typeface="IBM Plex Sans Light"/>
-                <a:sym typeface="IBM Plex Sans Light"/>
-              </a:rPr>
-              <a:t>git &lt;comm</a:t>
-            </a:r>
-            <a:r>
-              <a:rPr lang="en-US" sz="1600" dirty="0">
-                <a:latin typeface="IBM Plex Sans Light"/>
-                <a:ea typeface="IBM Plex Sans Light"/>
-                <a:cs typeface="IBM Plex Sans Light"/>
-                <a:sym typeface="IBM Plex Sans Light"/>
-              </a:rPr>
-              <a:t>and&gt; --help</a:t>
-            </a:r>
-          </a:p>
-        </p:txBody>
-      </p:sp>
     </p:spTree>
     <p:extLst>
       <p:ext uri="{BB962C8B-B14F-4D97-AF65-F5344CB8AC3E}">
@@ -9462,295 +8991,6 @@
           </a:extLst>
         </p:spPr>
       </p:pic>
-      <p:sp>
-        <p:nvSpPr>
-          <p:cNvPr id="11" name="TextBox 10">
-            <a:extLst>
-              <a:ext uri="{FF2B5EF4-FFF2-40B4-BE49-F238E27FC236}">
-                <a16:creationId xmlns:a16="http://schemas.microsoft.com/office/drawing/2014/main" id="{D74E3E41-997A-FA7A-07AF-9706F9BC685C}"/>
-              </a:ext>
-            </a:extLst>
-          </p:cNvPr>
-          <p:cNvSpPr txBox="1"/>
-          <p:nvPr/>
-        </p:nvSpPr>
-        <p:spPr>
-          <a:xfrm>
-            <a:off x="230426" y="1010822"/>
-            <a:ext cx="6328182" cy="1815882"/>
-          </a:xfrm>
-          <a:prstGeom prst="rect">
-            <a:avLst/>
-          </a:prstGeom>
-          <a:noFill/>
-        </p:spPr>
-        <p:txBody>
-          <a:bodyPr wrap="square">
-            <a:spAutoFit/>
-          </a:bodyPr>
-          <a:lstStyle/>
-          <a:p>
-            <a:pPr marL="0" lvl="0" indent="0" algn="l" rtl="0">
-              <a:spcBef>
-                <a:spcPts val="0"/>
-              </a:spcBef>
-              <a:spcAft>
-                <a:spcPts val="0"/>
-              </a:spcAft>
-              <a:buNone/>
-            </a:pPr>
-            <a:r>
-              <a:rPr lang="en" sz="1600" dirty="0">
-                <a:solidFill>
-                  <a:srgbClr val="EB3D26"/>
-                </a:solidFill>
-                <a:latin typeface="IBM Plex Sans Light"/>
-                <a:ea typeface="IBM Plex Sans Light"/>
-                <a:cs typeface="IBM Plex Sans Light"/>
-                <a:sym typeface="IBM Plex Sans Light"/>
-              </a:rPr>
-              <a:t>•</a:t>
-            </a:r>
-            <a:r>
-              <a:rPr lang="en" sz="1600" dirty="0">
-                <a:solidFill>
-                  <a:srgbClr val="000000"/>
-                </a:solidFill>
-                <a:latin typeface="IBM Plex Sans Light"/>
-                <a:ea typeface="IBM Plex Sans Light"/>
-                <a:cs typeface="IBM Plex Sans Light"/>
-                <a:sym typeface="IBM Plex Sans Light"/>
-              </a:rPr>
-              <a:t> </a:t>
-            </a:r>
-            <a:r>
-              <a:rPr lang="en-US" sz="1600" dirty="0">
-                <a:solidFill>
-                  <a:srgbClr val="000000"/>
-                </a:solidFill>
-                <a:latin typeface="IBM Plex Sans Light"/>
-                <a:ea typeface="IBM Plex Sans Light"/>
-                <a:cs typeface="IBM Plex Sans Light"/>
-                <a:sym typeface="IBM Plex Sans Light"/>
-              </a:rPr>
-              <a:t> git branch &lt;name</a:t>
-            </a:r>
-            <a:r>
-              <a:rPr lang="en-US" sz="1600" dirty="0">
-                <a:latin typeface="IBM Plex Sans Light"/>
-                <a:ea typeface="IBM Plex Sans Light"/>
-                <a:cs typeface="IBM Plex Sans Light"/>
-                <a:sym typeface="IBM Plex Sans Light"/>
-              </a:rPr>
-              <a:t>&gt;</a:t>
-            </a:r>
-          </a:p>
-          <a:p>
-            <a:pPr marL="0" lvl="0" indent="0" algn="l" rtl="0">
-              <a:spcBef>
-                <a:spcPts val="0"/>
-              </a:spcBef>
-              <a:spcAft>
-                <a:spcPts val="0"/>
-              </a:spcAft>
-              <a:buNone/>
-            </a:pPr>
-            <a:endParaRPr lang="en-US" sz="1600" dirty="0">
-              <a:latin typeface="IBM Plex Sans Light"/>
-              <a:ea typeface="IBM Plex Sans Light"/>
-              <a:cs typeface="IBM Plex Sans Light"/>
-              <a:sym typeface="IBM Plex Sans Light"/>
-            </a:endParaRPr>
-          </a:p>
-          <a:p>
-            <a:pPr marL="0" lvl="0" indent="0" algn="l" rtl="0">
-              <a:spcBef>
-                <a:spcPts val="0"/>
-              </a:spcBef>
-              <a:spcAft>
-                <a:spcPts val="0"/>
-              </a:spcAft>
-              <a:buNone/>
-            </a:pPr>
-            <a:r>
-              <a:rPr lang="en" sz="1600" dirty="0">
-                <a:solidFill>
-                  <a:srgbClr val="EB3D26"/>
-                </a:solidFill>
-                <a:latin typeface="IBM Plex Sans Light"/>
-                <a:ea typeface="IBM Plex Sans Light"/>
-                <a:cs typeface="IBM Plex Sans Light"/>
-                <a:sym typeface="IBM Plex Sans Light"/>
-              </a:rPr>
-              <a:t>•</a:t>
-            </a:r>
-            <a:r>
-              <a:rPr lang="en" sz="1600" dirty="0">
-                <a:solidFill>
-                  <a:srgbClr val="000000"/>
-                </a:solidFill>
-                <a:latin typeface="IBM Plex Sans Light"/>
-                <a:ea typeface="IBM Plex Sans Light"/>
-                <a:cs typeface="IBM Plex Sans Light"/>
-                <a:sym typeface="IBM Plex Sans Light"/>
-              </a:rPr>
-              <a:t>  git checkout &lt;branch&gt;</a:t>
-            </a:r>
-            <a:endParaRPr lang="en-US" sz="1600" dirty="0">
-              <a:latin typeface="IBM Plex Sans Light"/>
-              <a:ea typeface="IBM Plex Sans Light"/>
-              <a:cs typeface="IBM Plex Sans Light"/>
-              <a:sym typeface="IBM Plex Sans Light"/>
-            </a:endParaRPr>
-          </a:p>
-          <a:p>
-            <a:pPr marL="0" lvl="0" indent="0" algn="l" rtl="0">
-              <a:spcBef>
-                <a:spcPts val="0"/>
-              </a:spcBef>
-              <a:spcAft>
-                <a:spcPts val="0"/>
-              </a:spcAft>
-              <a:buNone/>
-            </a:pPr>
-            <a:endParaRPr lang="en-US" sz="1600" dirty="0">
-              <a:latin typeface="IBM Plex Sans Light"/>
-              <a:ea typeface="IBM Plex Sans Light"/>
-              <a:cs typeface="IBM Plex Sans Light"/>
-              <a:sym typeface="IBM Plex Sans Light"/>
-            </a:endParaRPr>
-          </a:p>
-          <a:p>
-            <a:pPr marL="0" lvl="0" indent="0" algn="l" rtl="0">
-              <a:spcBef>
-                <a:spcPts val="0"/>
-              </a:spcBef>
-              <a:spcAft>
-                <a:spcPts val="0"/>
-              </a:spcAft>
-              <a:buNone/>
-            </a:pPr>
-            <a:r>
-              <a:rPr lang="en" sz="1600" dirty="0">
-                <a:solidFill>
-                  <a:srgbClr val="EB3D26"/>
-                </a:solidFill>
-                <a:latin typeface="IBM Plex Sans Light"/>
-                <a:ea typeface="IBM Plex Sans Light"/>
-                <a:cs typeface="IBM Plex Sans Light"/>
-                <a:sym typeface="IBM Plex Sans Light"/>
-              </a:rPr>
-              <a:t>•</a:t>
-            </a:r>
-            <a:r>
-              <a:rPr lang="en" sz="1600" dirty="0">
-                <a:solidFill>
-                  <a:srgbClr val="000000"/>
-                </a:solidFill>
-                <a:latin typeface="IBM Plex Sans Light"/>
-                <a:ea typeface="IBM Plex Sans Light"/>
-                <a:cs typeface="IBM Plex Sans Light"/>
-                <a:sym typeface="IBM Plex Sans Light"/>
-              </a:rPr>
-              <a:t> </a:t>
-            </a:r>
-            <a:r>
-              <a:rPr lang="en-US" sz="1600" dirty="0">
-                <a:solidFill>
-                  <a:srgbClr val="000000"/>
-                </a:solidFill>
-                <a:latin typeface="IBM Plex Sans Light"/>
-                <a:ea typeface="IBM Plex Sans Light"/>
-                <a:cs typeface="IBM Plex Sans Light"/>
-                <a:sym typeface="IBM Plex Sans Light"/>
-              </a:rPr>
-              <a:t> </a:t>
-            </a:r>
-            <a:r>
-              <a:rPr lang="en-US" sz="1600" dirty="0">
-                <a:latin typeface="IBM Plex Sans Light"/>
-                <a:ea typeface="IBM Plex Sans Light"/>
-                <a:cs typeface="IBM Plex Sans Light"/>
-                <a:sym typeface="IBM Plex Sans Light"/>
-              </a:rPr>
-              <a:t>git merge &lt;branch&gt;</a:t>
-            </a:r>
-          </a:p>
-          <a:p>
-            <a:pPr marL="0" lvl="0" indent="0" algn="l" rtl="0">
-              <a:spcBef>
-                <a:spcPts val="0"/>
-              </a:spcBef>
-              <a:spcAft>
-                <a:spcPts val="0"/>
-              </a:spcAft>
-              <a:buNone/>
-            </a:pPr>
-            <a:endParaRPr lang="en-US" sz="1600" dirty="0">
-              <a:latin typeface="IBM Plex Sans Light"/>
-              <a:ea typeface="IBM Plex Sans Light"/>
-              <a:cs typeface="IBM Plex Sans Light"/>
-              <a:sym typeface="IBM Plex Sans Light"/>
-            </a:endParaRPr>
-          </a:p>
-          <a:p>
-            <a:pPr marL="0" lvl="0" indent="0" algn="l" rtl="0">
-              <a:spcBef>
-                <a:spcPts val="0"/>
-              </a:spcBef>
-              <a:spcAft>
-                <a:spcPts val="0"/>
-              </a:spcAft>
-              <a:buNone/>
-            </a:pPr>
-            <a:r>
-              <a:rPr lang="en" sz="1600" dirty="0">
-                <a:solidFill>
-                  <a:srgbClr val="EB3D26"/>
-                </a:solidFill>
-                <a:latin typeface="IBM Plex Sans Light"/>
-                <a:ea typeface="IBM Plex Sans Light"/>
-                <a:cs typeface="IBM Plex Sans Light"/>
-                <a:sym typeface="IBM Plex Sans Light"/>
-              </a:rPr>
-              <a:t>•</a:t>
-            </a:r>
-            <a:r>
-              <a:rPr lang="en" sz="1600" dirty="0">
-                <a:solidFill>
-                  <a:srgbClr val="000000"/>
-                </a:solidFill>
-                <a:latin typeface="IBM Plex Sans Light"/>
-                <a:ea typeface="IBM Plex Sans Light"/>
-                <a:cs typeface="IBM Plex Sans Light"/>
-                <a:sym typeface="IBM Plex Sans Light"/>
-              </a:rPr>
-              <a:t> </a:t>
-            </a:r>
-            <a:r>
-              <a:rPr lang="en-US" sz="1600" dirty="0">
-                <a:solidFill>
-                  <a:srgbClr val="000000"/>
-                </a:solidFill>
-                <a:latin typeface="IBM Plex Sans Light"/>
-                <a:ea typeface="IBM Plex Sans Light"/>
-                <a:cs typeface="IBM Plex Sans Light"/>
-                <a:sym typeface="IBM Plex Sans Light"/>
-              </a:rPr>
-              <a:t> </a:t>
-            </a:r>
-            <a:r>
-              <a:rPr lang="en-US" sz="1600" dirty="0">
-                <a:latin typeface="IBM Plex Sans Light"/>
-                <a:ea typeface="IBM Plex Sans Light"/>
-                <a:cs typeface="IBM Plex Sans Light"/>
-                <a:sym typeface="IBM Plex Sans Light"/>
-              </a:rPr>
-              <a:t>git rebase &lt;branch&gt;</a:t>
-            </a:r>
-          </a:p>
-        </p:txBody>
-      </p:sp>
     </p:spTree>
     <p:extLst>
       <p:ext uri="{BB962C8B-B14F-4D97-AF65-F5344CB8AC3E}">
@@ -9851,8 +9091,8 @@
         </p:blipFill>
         <p:spPr bwMode="auto">
           <a:xfrm>
-            <a:off x="1975941" y="1891865"/>
-            <a:ext cx="6785142" cy="2854562"/>
+            <a:off x="400422" y="1229032"/>
+            <a:ext cx="8360661" cy="3517395"/>
           </a:xfrm>
           <a:prstGeom prst="rect">
             <a:avLst/>
@@ -9882,383 +9122,6 @@
           </a:extLst>
         </p:spPr>
       </p:pic>
-      <p:sp>
-        <p:nvSpPr>
-          <p:cNvPr id="11" name="TextBox 10">
-            <a:extLst>
-              <a:ext uri="{FF2B5EF4-FFF2-40B4-BE49-F238E27FC236}">
-                <a16:creationId xmlns:a16="http://schemas.microsoft.com/office/drawing/2014/main" id="{D74E3E41-997A-FA7A-07AF-9706F9BC685C}"/>
-              </a:ext>
-            </a:extLst>
-          </p:cNvPr>
-          <p:cNvSpPr txBox="1"/>
-          <p:nvPr/>
-        </p:nvSpPr>
-        <p:spPr>
-          <a:xfrm>
-            <a:off x="230426" y="1010822"/>
-            <a:ext cx="3127371" cy="2308324"/>
-          </a:xfrm>
-          <a:prstGeom prst="rect">
-            <a:avLst/>
-          </a:prstGeom>
-          <a:noFill/>
-        </p:spPr>
-        <p:txBody>
-          <a:bodyPr wrap="square">
-            <a:spAutoFit/>
-          </a:bodyPr>
-          <a:lstStyle/>
-          <a:p>
-            <a:pPr marL="0" lvl="0" indent="0" algn="l" rtl="0">
-              <a:spcBef>
-                <a:spcPts val="0"/>
-              </a:spcBef>
-              <a:spcAft>
-                <a:spcPts val="0"/>
-              </a:spcAft>
-              <a:buNone/>
-            </a:pPr>
-            <a:r>
-              <a:rPr lang="en" sz="1600" dirty="0">
-                <a:solidFill>
-                  <a:srgbClr val="EB3D26"/>
-                </a:solidFill>
-                <a:latin typeface="IBM Plex Sans Light"/>
-                <a:ea typeface="IBM Plex Sans Light"/>
-                <a:cs typeface="IBM Plex Sans Light"/>
-                <a:sym typeface="IBM Plex Sans Light"/>
-              </a:rPr>
-              <a:t>•</a:t>
-            </a:r>
-            <a:r>
-              <a:rPr lang="en" sz="1600" dirty="0">
-                <a:solidFill>
-                  <a:srgbClr val="000000"/>
-                </a:solidFill>
-                <a:latin typeface="IBM Plex Sans Light"/>
-                <a:ea typeface="IBM Plex Sans Light"/>
-                <a:cs typeface="IBM Plex Sans Light"/>
-                <a:sym typeface="IBM Plex Sans Light"/>
-              </a:rPr>
-              <a:t> </a:t>
-            </a:r>
-            <a:r>
-              <a:rPr lang="en-US" sz="1600" dirty="0">
-                <a:solidFill>
-                  <a:srgbClr val="000000"/>
-                </a:solidFill>
-                <a:latin typeface="IBM Plex Sans Light"/>
-                <a:ea typeface="IBM Plex Sans Light"/>
-                <a:cs typeface="IBM Plex Sans Light"/>
-                <a:sym typeface="IBM Plex Sans Light"/>
-              </a:rPr>
-              <a:t> </a:t>
-            </a:r>
-            <a:r>
-              <a:rPr lang="en-US" sz="1600" dirty="0">
-                <a:latin typeface="IBM Plex Sans Light"/>
-                <a:ea typeface="IBM Plex Sans Light"/>
-                <a:cs typeface="IBM Plex Sans Light"/>
-                <a:sym typeface="IBM Plex Sans Light"/>
-              </a:rPr>
-              <a:t>git clone</a:t>
-            </a:r>
-          </a:p>
-          <a:p>
-            <a:pPr marL="0" lvl="0" indent="0" algn="l" rtl="0">
-              <a:spcBef>
-                <a:spcPts val="0"/>
-              </a:spcBef>
-              <a:spcAft>
-                <a:spcPts val="0"/>
-              </a:spcAft>
-              <a:buNone/>
-            </a:pPr>
-            <a:endParaRPr lang="en-US" sz="1600" dirty="0">
-              <a:latin typeface="IBM Plex Sans Light"/>
-              <a:ea typeface="IBM Plex Sans Light"/>
-              <a:cs typeface="IBM Plex Sans Light"/>
-              <a:sym typeface="IBM Plex Sans Light"/>
-            </a:endParaRPr>
-          </a:p>
-          <a:p>
-            <a:pPr marL="0" lvl="0" indent="0" algn="l" rtl="0">
-              <a:spcBef>
-                <a:spcPts val="0"/>
-              </a:spcBef>
-              <a:spcAft>
-                <a:spcPts val="0"/>
-              </a:spcAft>
-              <a:buNone/>
-            </a:pPr>
-            <a:r>
-              <a:rPr lang="en" sz="1600" dirty="0">
-                <a:solidFill>
-                  <a:srgbClr val="EB3D26"/>
-                </a:solidFill>
-                <a:latin typeface="IBM Plex Sans Light"/>
-                <a:ea typeface="IBM Plex Sans Light"/>
-                <a:cs typeface="IBM Plex Sans Light"/>
-                <a:sym typeface="IBM Plex Sans Light"/>
-              </a:rPr>
-              <a:t>•</a:t>
-            </a:r>
-            <a:r>
-              <a:rPr lang="en" sz="1600" dirty="0">
-                <a:solidFill>
-                  <a:srgbClr val="000000"/>
-                </a:solidFill>
-                <a:latin typeface="IBM Plex Sans Light"/>
-                <a:ea typeface="IBM Plex Sans Light"/>
-                <a:cs typeface="IBM Plex Sans Light"/>
-                <a:sym typeface="IBM Plex Sans Light"/>
-              </a:rPr>
-              <a:t>  </a:t>
-            </a:r>
-            <a:r>
-              <a:rPr lang="en" sz="1600" dirty="0">
-                <a:latin typeface="IBM Plex Sans Light"/>
-                <a:ea typeface="IBM Plex Sans Light"/>
-                <a:cs typeface="IBM Plex Sans Light"/>
-                <a:sym typeface="IBM Plex Sans Light"/>
-              </a:rPr>
-              <a:t>git fetch</a:t>
-            </a:r>
-            <a:endParaRPr lang="en-US" sz="1600" dirty="0">
-              <a:latin typeface="IBM Plex Sans Light"/>
-              <a:ea typeface="IBM Plex Sans Light"/>
-              <a:cs typeface="IBM Plex Sans Light"/>
-              <a:sym typeface="IBM Plex Sans Light"/>
-            </a:endParaRPr>
-          </a:p>
-          <a:p>
-            <a:pPr marL="0" lvl="0" indent="0" algn="l" rtl="0">
-              <a:spcBef>
-                <a:spcPts val="0"/>
-              </a:spcBef>
-              <a:spcAft>
-                <a:spcPts val="0"/>
-              </a:spcAft>
-              <a:buNone/>
-            </a:pPr>
-            <a:endParaRPr lang="en-US" sz="1600" dirty="0">
-              <a:latin typeface="IBM Plex Sans Light"/>
-              <a:ea typeface="IBM Plex Sans Light"/>
-              <a:cs typeface="IBM Plex Sans Light"/>
-              <a:sym typeface="IBM Plex Sans Light"/>
-            </a:endParaRPr>
-          </a:p>
-          <a:p>
-            <a:pPr marL="0" lvl="0" indent="0" algn="l" rtl="0">
-              <a:spcBef>
-                <a:spcPts val="0"/>
-              </a:spcBef>
-              <a:spcAft>
-                <a:spcPts val="0"/>
-              </a:spcAft>
-              <a:buNone/>
-            </a:pPr>
-            <a:r>
-              <a:rPr lang="en" sz="1600" dirty="0">
-                <a:solidFill>
-                  <a:srgbClr val="EB3D26"/>
-                </a:solidFill>
-                <a:latin typeface="IBM Plex Sans Light"/>
-                <a:ea typeface="IBM Plex Sans Light"/>
-                <a:cs typeface="IBM Plex Sans Light"/>
-                <a:sym typeface="IBM Plex Sans Light"/>
-              </a:rPr>
-              <a:t>•</a:t>
-            </a:r>
-            <a:r>
-              <a:rPr lang="en" sz="1600" dirty="0">
-                <a:solidFill>
-                  <a:srgbClr val="000000"/>
-                </a:solidFill>
-                <a:latin typeface="IBM Plex Sans Light"/>
-                <a:ea typeface="IBM Plex Sans Light"/>
-                <a:cs typeface="IBM Plex Sans Light"/>
-                <a:sym typeface="IBM Plex Sans Light"/>
-              </a:rPr>
-              <a:t> </a:t>
-            </a:r>
-            <a:r>
-              <a:rPr lang="en-US" sz="1600" dirty="0">
-                <a:solidFill>
-                  <a:srgbClr val="000000"/>
-                </a:solidFill>
-                <a:latin typeface="IBM Plex Sans Light"/>
-                <a:ea typeface="IBM Plex Sans Light"/>
-                <a:cs typeface="IBM Plex Sans Light"/>
-                <a:sym typeface="IBM Plex Sans Light"/>
-              </a:rPr>
-              <a:t> g</a:t>
-            </a:r>
-            <a:r>
-              <a:rPr lang="en-US" sz="1600" dirty="0">
-                <a:latin typeface="IBM Plex Sans Light"/>
-                <a:ea typeface="IBM Plex Sans Light"/>
-                <a:cs typeface="IBM Plex Sans Light"/>
-                <a:sym typeface="IBM Plex Sans Light"/>
-              </a:rPr>
-              <a:t>it push</a:t>
-            </a:r>
-          </a:p>
-          <a:p>
-            <a:pPr marL="0" lvl="0" indent="0" algn="l" rtl="0">
-              <a:spcBef>
-                <a:spcPts val="0"/>
-              </a:spcBef>
-              <a:spcAft>
-                <a:spcPts val="0"/>
-              </a:spcAft>
-              <a:buNone/>
-            </a:pPr>
-            <a:endParaRPr lang="en-US" sz="1600" dirty="0">
-              <a:latin typeface="IBM Plex Sans Light"/>
-              <a:ea typeface="IBM Plex Sans Light"/>
-              <a:cs typeface="IBM Plex Sans Light"/>
-              <a:sym typeface="IBM Plex Sans Light"/>
-            </a:endParaRPr>
-          </a:p>
-          <a:p>
-            <a:pPr marL="0" lvl="0" indent="0" algn="l" rtl="0">
-              <a:spcBef>
-                <a:spcPts val="0"/>
-              </a:spcBef>
-              <a:spcAft>
-                <a:spcPts val="0"/>
-              </a:spcAft>
-              <a:buNone/>
-            </a:pPr>
-            <a:r>
-              <a:rPr lang="en" sz="1600" dirty="0">
-                <a:solidFill>
-                  <a:srgbClr val="EB3D26"/>
-                </a:solidFill>
-                <a:latin typeface="IBM Plex Sans Light"/>
-                <a:ea typeface="IBM Plex Sans Light"/>
-                <a:cs typeface="IBM Plex Sans Light"/>
-                <a:sym typeface="IBM Plex Sans Light"/>
-              </a:rPr>
-              <a:t>•</a:t>
-            </a:r>
-            <a:r>
-              <a:rPr lang="en" sz="1600" dirty="0">
-                <a:solidFill>
-                  <a:srgbClr val="000000"/>
-                </a:solidFill>
-                <a:latin typeface="IBM Plex Sans Light"/>
-                <a:ea typeface="IBM Plex Sans Light"/>
-                <a:cs typeface="IBM Plex Sans Light"/>
-                <a:sym typeface="IBM Plex Sans Light"/>
-              </a:rPr>
-              <a:t> </a:t>
-            </a:r>
-            <a:r>
-              <a:rPr lang="en-US" sz="1600" dirty="0">
-                <a:solidFill>
-                  <a:srgbClr val="000000"/>
-                </a:solidFill>
-                <a:latin typeface="IBM Plex Sans Light"/>
-                <a:ea typeface="IBM Plex Sans Light"/>
-                <a:cs typeface="IBM Plex Sans Light"/>
-                <a:sym typeface="IBM Plex Sans Light"/>
-              </a:rPr>
-              <a:t> git pull (fetch + merge)</a:t>
-            </a:r>
-            <a:endParaRPr lang="en-US" sz="1600" dirty="0">
-              <a:latin typeface="IBM Plex Sans Light"/>
-              <a:ea typeface="IBM Plex Sans Light"/>
-              <a:cs typeface="IBM Plex Sans Light"/>
-              <a:sym typeface="IBM Plex Sans Light"/>
-            </a:endParaRPr>
-          </a:p>
-          <a:p>
-            <a:pPr marL="0" lvl="0" indent="0" algn="l" rtl="0">
-              <a:spcBef>
-                <a:spcPts val="0"/>
-              </a:spcBef>
-              <a:spcAft>
-                <a:spcPts val="0"/>
-              </a:spcAft>
-              <a:buNone/>
-            </a:pPr>
-            <a:endParaRPr lang="en-US" sz="1600" dirty="0">
-              <a:latin typeface="IBM Plex Sans Light"/>
-              <a:ea typeface="IBM Plex Sans Light"/>
-              <a:cs typeface="IBM Plex Sans Light"/>
-              <a:sym typeface="IBM Plex Sans Light"/>
-            </a:endParaRPr>
-          </a:p>
-          <a:p>
-            <a:r>
-              <a:rPr lang="en" sz="1600" dirty="0">
-                <a:solidFill>
-                  <a:srgbClr val="EB3D26"/>
-                </a:solidFill>
-                <a:latin typeface="IBM Plex Sans Light"/>
-                <a:ea typeface="IBM Plex Sans Light"/>
-                <a:cs typeface="IBM Plex Sans Light"/>
-                <a:sym typeface="IBM Plex Sans Light"/>
-              </a:rPr>
-              <a:t>•</a:t>
-            </a:r>
-            <a:r>
-              <a:rPr lang="en" sz="1600" dirty="0">
-                <a:solidFill>
-                  <a:srgbClr val="000000"/>
-                </a:solidFill>
-                <a:latin typeface="IBM Plex Sans Light"/>
-                <a:ea typeface="IBM Plex Sans Light"/>
-                <a:cs typeface="IBM Plex Sans Light"/>
-                <a:sym typeface="IBM Plex Sans Light"/>
-              </a:rPr>
-              <a:t> </a:t>
-            </a:r>
-            <a:r>
-              <a:rPr lang="en-US" sz="1600" dirty="0">
-                <a:solidFill>
-                  <a:srgbClr val="000000"/>
-                </a:solidFill>
-                <a:latin typeface="IBM Plex Sans Light"/>
-                <a:ea typeface="IBM Plex Sans Light"/>
-                <a:cs typeface="IBM Plex Sans Light"/>
-                <a:sym typeface="IBM Plex Sans Light"/>
-              </a:rPr>
-              <a:t> </a:t>
-            </a:r>
-            <a:r>
-              <a:rPr lang="en-US" sz="1600" dirty="0">
-                <a:latin typeface="IBM Plex Sans Light"/>
-                <a:ea typeface="IBM Plex Sans Light"/>
-                <a:cs typeface="IBM Plex Sans Light"/>
-                <a:sym typeface="IBM Plex Sans Light"/>
-              </a:rPr>
-              <a:t>git remote add origin &lt;</a:t>
-            </a:r>
-            <a:r>
-              <a:rPr lang="en-US" sz="1600" dirty="0" err="1">
-                <a:latin typeface="IBM Plex Sans Light"/>
-                <a:ea typeface="IBM Plex Sans Light"/>
-                <a:cs typeface="IBM Plex Sans Light"/>
-                <a:sym typeface="IBM Plex Sans Light"/>
-              </a:rPr>
-              <a:t>url</a:t>
-            </a:r>
-            <a:r>
-              <a:rPr lang="en-US" sz="1600" dirty="0">
-                <a:latin typeface="IBM Plex Sans Light"/>
-                <a:ea typeface="IBM Plex Sans Light"/>
-                <a:cs typeface="IBM Plex Sans Light"/>
-                <a:sym typeface="IBM Plex Sans Light"/>
-              </a:rPr>
-              <a:t>&gt;</a:t>
-            </a:r>
-          </a:p>
-        </p:txBody>
-      </p:sp>
     </p:spTree>
     <p:extLst>
       <p:ext uri="{BB962C8B-B14F-4D97-AF65-F5344CB8AC3E}">
@@ -10587,8 +9450,8 @@
         </p:blipFill>
         <p:spPr bwMode="auto">
           <a:xfrm>
-            <a:off x="2376264" y="637243"/>
-            <a:ext cx="6281236" cy="4132392"/>
+            <a:off x="1956619" y="637243"/>
+            <a:ext cx="6700881" cy="4408474"/>
           </a:xfrm>
           <a:prstGeom prst="rect">
             <a:avLst/>
@@ -10605,219 +9468,6 @@
           </a:extLst>
         </p:spPr>
       </p:pic>
-      <p:sp>
-        <p:nvSpPr>
-          <p:cNvPr id="2" name="TextBox 1">
-            <a:extLst>
-              <a:ext uri="{FF2B5EF4-FFF2-40B4-BE49-F238E27FC236}">
-                <a16:creationId xmlns:a16="http://schemas.microsoft.com/office/drawing/2014/main" id="{D4590E4B-D659-926E-FF94-5BD3F62A2F02}"/>
-              </a:ext>
-            </a:extLst>
-          </p:cNvPr>
-          <p:cNvSpPr txBox="1"/>
-          <p:nvPr/>
-        </p:nvSpPr>
-        <p:spPr>
-          <a:xfrm>
-            <a:off x="367586" y="962879"/>
-            <a:ext cx="3259534" cy="1323439"/>
-          </a:xfrm>
-          <a:prstGeom prst="rect">
-            <a:avLst/>
-          </a:prstGeom>
-          <a:noFill/>
-        </p:spPr>
-        <p:txBody>
-          <a:bodyPr wrap="square">
-            <a:spAutoFit/>
-          </a:bodyPr>
-          <a:lstStyle/>
-          <a:p>
-            <a:pPr marL="0" lvl="0" indent="0" algn="l" rtl="0">
-              <a:spcBef>
-                <a:spcPts val="0"/>
-              </a:spcBef>
-              <a:spcAft>
-                <a:spcPts val="0"/>
-              </a:spcAft>
-              <a:buNone/>
-            </a:pPr>
-            <a:r>
-              <a:rPr lang="en" sz="1600" dirty="0">
-                <a:solidFill>
-                  <a:srgbClr val="EB3D26"/>
-                </a:solidFill>
-                <a:latin typeface="IBM Plex Sans Light"/>
-                <a:ea typeface="IBM Plex Sans Light"/>
-                <a:cs typeface="IBM Plex Sans Light"/>
-                <a:sym typeface="IBM Plex Sans Light"/>
-              </a:rPr>
-              <a:t>•</a:t>
-            </a:r>
-            <a:r>
-              <a:rPr lang="en" sz="1600" dirty="0">
-                <a:solidFill>
-                  <a:srgbClr val="000000"/>
-                </a:solidFill>
-                <a:latin typeface="IBM Plex Sans Light"/>
-                <a:ea typeface="IBM Plex Sans Light"/>
-                <a:cs typeface="IBM Plex Sans Light"/>
-                <a:sym typeface="IBM Plex Sans Light"/>
-              </a:rPr>
-              <a:t> </a:t>
-            </a:r>
-            <a:r>
-              <a:rPr lang="en-US" sz="1600" dirty="0">
-                <a:solidFill>
-                  <a:srgbClr val="000000"/>
-                </a:solidFill>
-                <a:latin typeface="IBM Plex Sans Light"/>
-                <a:ea typeface="IBM Plex Sans Light"/>
-                <a:cs typeface="IBM Plex Sans Light"/>
-                <a:sym typeface="IBM Plex Sans Light"/>
-              </a:rPr>
-              <a:t> git rebase</a:t>
-            </a:r>
-            <a:endParaRPr lang="en-US" sz="1600" dirty="0">
-              <a:latin typeface="IBM Plex Sans Light"/>
-              <a:ea typeface="IBM Plex Sans Light"/>
-              <a:cs typeface="IBM Plex Sans Light"/>
-              <a:sym typeface="IBM Plex Sans Light"/>
-            </a:endParaRPr>
-          </a:p>
-          <a:p>
-            <a:pPr marL="0" lvl="0" indent="0" algn="l" rtl="0">
-              <a:spcBef>
-                <a:spcPts val="0"/>
-              </a:spcBef>
-              <a:spcAft>
-                <a:spcPts val="0"/>
-              </a:spcAft>
-              <a:buNone/>
-            </a:pPr>
-            <a:endParaRPr lang="en-US" sz="1600" dirty="0">
-              <a:latin typeface="IBM Plex Sans Light"/>
-              <a:ea typeface="IBM Plex Sans Light"/>
-              <a:cs typeface="IBM Plex Sans Light"/>
-              <a:sym typeface="IBM Plex Sans Light"/>
-            </a:endParaRPr>
-          </a:p>
-          <a:p>
-            <a:pPr marL="0" lvl="0" indent="0" algn="l" rtl="0">
-              <a:spcBef>
-                <a:spcPts val="0"/>
-              </a:spcBef>
-              <a:spcAft>
-                <a:spcPts val="0"/>
-              </a:spcAft>
-              <a:buNone/>
-            </a:pPr>
-            <a:r>
-              <a:rPr lang="en" sz="1600" dirty="0">
-                <a:solidFill>
-                  <a:srgbClr val="EB3D26"/>
-                </a:solidFill>
-                <a:latin typeface="IBM Plex Sans Light"/>
-                <a:ea typeface="IBM Plex Sans Light"/>
-                <a:cs typeface="IBM Plex Sans Light"/>
-                <a:sym typeface="IBM Plex Sans Light"/>
-              </a:rPr>
-              <a:t>•</a:t>
-            </a:r>
-            <a:r>
-              <a:rPr lang="en" sz="1600" dirty="0">
-                <a:solidFill>
-                  <a:srgbClr val="000000"/>
-                </a:solidFill>
-                <a:latin typeface="IBM Plex Sans Light"/>
-                <a:ea typeface="IBM Plex Sans Light"/>
-                <a:cs typeface="IBM Plex Sans Light"/>
-                <a:sym typeface="IBM Plex Sans Light"/>
-              </a:rPr>
-              <a:t>  git rebase –onto &lt;base&gt;</a:t>
-            </a:r>
-            <a:endParaRPr lang="en-US" sz="1600" dirty="0">
-              <a:latin typeface="IBM Plex Sans Light"/>
-              <a:ea typeface="IBM Plex Sans Light"/>
-              <a:cs typeface="IBM Plex Sans Light"/>
-              <a:sym typeface="IBM Plex Sans Light"/>
-            </a:endParaRPr>
-          </a:p>
-          <a:p>
-            <a:pPr marL="0" lvl="0" indent="0" algn="l" rtl="0">
-              <a:spcBef>
-                <a:spcPts val="0"/>
-              </a:spcBef>
-              <a:spcAft>
-                <a:spcPts val="0"/>
-              </a:spcAft>
-              <a:buNone/>
-            </a:pPr>
-            <a:endParaRPr lang="en-US" sz="1600" dirty="0">
-              <a:latin typeface="IBM Plex Sans Light"/>
-              <a:ea typeface="IBM Plex Sans Light"/>
-              <a:cs typeface="IBM Plex Sans Light"/>
-              <a:sym typeface="IBM Plex Sans Light"/>
-            </a:endParaRPr>
-          </a:p>
-          <a:p>
-            <a:pPr marL="0" lvl="0" indent="0" algn="l" rtl="0">
-              <a:spcBef>
-                <a:spcPts val="0"/>
-              </a:spcBef>
-              <a:spcAft>
-                <a:spcPts val="0"/>
-              </a:spcAft>
-              <a:buNone/>
-            </a:pPr>
-            <a:r>
-              <a:rPr lang="en" sz="1600" dirty="0">
-                <a:solidFill>
-                  <a:srgbClr val="EB3D26"/>
-                </a:solidFill>
-                <a:latin typeface="IBM Plex Sans Light"/>
-                <a:ea typeface="IBM Plex Sans Light"/>
-                <a:cs typeface="IBM Plex Sans Light"/>
-                <a:sym typeface="IBM Plex Sans Light"/>
-              </a:rPr>
-              <a:t>•</a:t>
-            </a:r>
-            <a:r>
-              <a:rPr lang="en" sz="1600" dirty="0">
-                <a:solidFill>
-                  <a:srgbClr val="000000"/>
-                </a:solidFill>
-                <a:latin typeface="IBM Plex Sans Light"/>
-                <a:ea typeface="IBM Plex Sans Light"/>
-                <a:cs typeface="IBM Plex Sans Light"/>
-                <a:sym typeface="IBM Plex Sans Light"/>
-              </a:rPr>
-              <a:t> </a:t>
-            </a:r>
-            <a:r>
-              <a:rPr lang="en-US" sz="1600" dirty="0">
-                <a:solidFill>
-                  <a:srgbClr val="000000"/>
-                </a:solidFill>
-                <a:latin typeface="IBM Plex Sans Light"/>
-                <a:ea typeface="IBM Plex Sans Light"/>
-                <a:cs typeface="IBM Plex Sans Light"/>
-                <a:sym typeface="IBM Plex Sans Light"/>
-              </a:rPr>
-              <a:t> </a:t>
-            </a:r>
-            <a:r>
-              <a:rPr lang="en-US" sz="1600" dirty="0">
-                <a:latin typeface="IBM Plex Sans Light"/>
-                <a:ea typeface="IBM Plex Sans Light"/>
-                <a:cs typeface="IBM Plex Sans Light"/>
-                <a:sym typeface="IBM Plex Sans Light"/>
-              </a:rPr>
-              <a:t>git push -- force</a:t>
-            </a:r>
-          </a:p>
-        </p:txBody>
-      </p:sp>
     </p:spTree>
     <p:extLst>
       <p:ext uri="{BB962C8B-B14F-4D97-AF65-F5344CB8AC3E}">

</xml_diff>